<commit_message>
added modules from ENAR webinar
</commit_message>
<xml_diff>
--- a/modules/figures/littersDAG.pptx
+++ b/modules/figures/littersDAG.pptx
@@ -104,6 +104,22 @@
       </a:defRPr>
     </a:lvl9pPr>
   </p:defaultTextStyle>
+  <p:extLst>
+    <p:ext uri="{EFAFB233-063F-42B5-8137-9DF3F51BA10A}">
+      <p15:sldGuideLst xmlns:p15="http://schemas.microsoft.com/office/powerpoint/2012/main">
+        <p15:guide id="1" orient="horz" pos="2160">
+          <p15:clr>
+            <a:srgbClr val="A4A3A4"/>
+          </p15:clr>
+        </p15:guide>
+        <p15:guide id="2" pos="2880">
+          <p15:clr>
+            <a:srgbClr val="A4A3A4"/>
+          </p15:clr>
+        </p15:guide>
+      </p15:sldGuideLst>
+    </p:ext>
+  </p:extLst>
 </p:presentation>
 </file>
 
@@ -288,7 +304,7 @@
           <a:p>
             <a:fld id="{2CEAAE11-9B4E-F046-B376-F35E51811D5B}" type="datetimeFigureOut">
               <a:rPr lang="en-US" smtClean="0"/>
-              <a:t>3/30/16</a:t>
+              <a:t>4/10/18</a:t>
             </a:fld>
             <a:endParaRPr lang="en-US"/>
           </a:p>
@@ -458,7 +474,7 @@
           <a:p>
             <a:fld id="{2CEAAE11-9B4E-F046-B376-F35E51811D5B}" type="datetimeFigureOut">
               <a:rPr lang="en-US" smtClean="0"/>
-              <a:t>3/30/16</a:t>
+              <a:t>4/10/18</a:t>
             </a:fld>
             <a:endParaRPr lang="en-US"/>
           </a:p>
@@ -638,7 +654,7 @@
           <a:p>
             <a:fld id="{2CEAAE11-9B4E-F046-B376-F35E51811D5B}" type="datetimeFigureOut">
               <a:rPr lang="en-US" smtClean="0"/>
-              <a:t>3/30/16</a:t>
+              <a:t>4/10/18</a:t>
             </a:fld>
             <a:endParaRPr lang="en-US"/>
           </a:p>
@@ -808,7 +824,7 @@
           <a:p>
             <a:fld id="{2CEAAE11-9B4E-F046-B376-F35E51811D5B}" type="datetimeFigureOut">
               <a:rPr lang="en-US" smtClean="0"/>
-              <a:t>3/30/16</a:t>
+              <a:t>4/10/18</a:t>
             </a:fld>
             <a:endParaRPr lang="en-US"/>
           </a:p>
@@ -1054,7 +1070,7 @@
           <a:p>
             <a:fld id="{2CEAAE11-9B4E-F046-B376-F35E51811D5B}" type="datetimeFigureOut">
               <a:rPr lang="en-US" smtClean="0"/>
-              <a:t>3/30/16</a:t>
+              <a:t>4/10/18</a:t>
             </a:fld>
             <a:endParaRPr lang="en-US"/>
           </a:p>
@@ -1342,7 +1358,7 @@
           <a:p>
             <a:fld id="{2CEAAE11-9B4E-F046-B376-F35E51811D5B}" type="datetimeFigureOut">
               <a:rPr lang="en-US" smtClean="0"/>
-              <a:t>3/30/16</a:t>
+              <a:t>4/10/18</a:t>
             </a:fld>
             <a:endParaRPr lang="en-US"/>
           </a:p>
@@ -1764,7 +1780,7 @@
           <a:p>
             <a:fld id="{2CEAAE11-9B4E-F046-B376-F35E51811D5B}" type="datetimeFigureOut">
               <a:rPr lang="en-US" smtClean="0"/>
-              <a:t>3/30/16</a:t>
+              <a:t>4/10/18</a:t>
             </a:fld>
             <a:endParaRPr lang="en-US"/>
           </a:p>
@@ -1882,7 +1898,7 @@
           <a:p>
             <a:fld id="{2CEAAE11-9B4E-F046-B376-F35E51811D5B}" type="datetimeFigureOut">
               <a:rPr lang="en-US" smtClean="0"/>
-              <a:t>3/30/16</a:t>
+              <a:t>4/10/18</a:t>
             </a:fld>
             <a:endParaRPr lang="en-US"/>
           </a:p>
@@ -1977,7 +1993,7 @@
           <a:p>
             <a:fld id="{2CEAAE11-9B4E-F046-B376-F35E51811D5B}" type="datetimeFigureOut">
               <a:rPr lang="en-US" smtClean="0"/>
-              <a:t>3/30/16</a:t>
+              <a:t>4/10/18</a:t>
             </a:fld>
             <a:endParaRPr lang="en-US"/>
           </a:p>
@@ -2254,7 +2270,7 @@
           <a:p>
             <a:fld id="{2CEAAE11-9B4E-F046-B376-F35E51811D5B}" type="datetimeFigureOut">
               <a:rPr lang="en-US" smtClean="0"/>
-              <a:t>3/30/16</a:t>
+              <a:t>4/10/18</a:t>
             </a:fld>
             <a:endParaRPr lang="en-US"/>
           </a:p>
@@ -2507,7 +2523,7 @@
           <a:p>
             <a:fld id="{2CEAAE11-9B4E-F046-B376-F35E51811D5B}" type="datetimeFigureOut">
               <a:rPr lang="en-US" smtClean="0"/>
-              <a:t>3/30/16</a:t>
+              <a:t>4/10/18</a:t>
             </a:fld>
             <a:endParaRPr lang="en-US"/>
           </a:p>
@@ -2720,7 +2736,7 @@
           <a:p>
             <a:fld id="{2CEAAE11-9B4E-F046-B376-F35E51811D5B}" type="datetimeFigureOut">
               <a:rPr lang="en-US" smtClean="0"/>
-              <a:t>3/30/16</a:t>
+              <a:t>4/10/18</a:t>
             </a:fld>
             <a:endParaRPr lang="en-US"/>
           </a:p>
@@ -3322,7 +3338,7 @@
           <a:p>
             <a:pPr algn="ctr"/>
             <a:r>
-              <a:rPr lang="en-US" sz="2800" dirty="0" err="1">
+              <a:rPr lang="en-US" sz="2800" dirty="0" err="1" smtClean="0">
                 <a:solidFill>
                   <a:schemeClr val="tx1"/>
                 </a:solidFill>
@@ -3330,12 +3346,12 @@
               <a:t>a</a:t>
             </a:r>
             <a:r>
-              <a:rPr lang="en-US" sz="2800" baseline="-25000" dirty="0" err="1" smtClean="0">
+              <a:rPr lang="en-US" sz="2800" baseline="-25000" dirty="0" err="1">
                 <a:solidFill>
                   <a:schemeClr val="tx1"/>
                 </a:solidFill>
               </a:rPr>
-              <a:t>j</a:t>
+              <a:t>i</a:t>
             </a:r>
             <a:endParaRPr lang="en-US" sz="2800" dirty="0">
               <a:solidFill>
@@ -3521,7 +3537,11 @@
           <a:p>
             <a:r>
               <a:rPr lang="en-US" dirty="0" smtClean="0"/>
-              <a:t>Group j</a:t>
+              <a:t>Group </a:t>
+            </a:r>
+            <a:r>
+              <a:rPr lang="en-US" dirty="0" err="1" smtClean="0"/>
+              <a:t>i</a:t>
             </a:r>
             <a:endParaRPr lang="en-US" dirty="0"/>
           </a:p>
@@ -3555,8 +3575,9 @@
             </a:r>
             <a:r>
               <a:rPr lang="en-US" dirty="0"/>
-              <a:t>i</a:t>
-            </a:r>
+              <a:t>j</a:t>
+            </a:r>
+            <a:endParaRPr lang="en-US" dirty="0"/>
           </a:p>
         </p:txBody>
       </p:sp>
@@ -3601,7 +3622,7 @@
           <a:p>
             <a:pPr algn="ctr"/>
             <a:r>
-              <a:rPr lang="en-US" sz="2800" dirty="0" err="1" smtClean="0">
+              <a:rPr lang="en-US" sz="2800" dirty="0" smtClean="0">
                 <a:solidFill>
                   <a:schemeClr val="tx1"/>
                 </a:solidFill>
@@ -3609,12 +3630,12 @@
               <a:t>b</a:t>
             </a:r>
             <a:r>
-              <a:rPr lang="en-US" sz="2800" baseline="-25000" dirty="0" err="1" smtClean="0">
+              <a:rPr lang="en-US" sz="2800" baseline="-25000" dirty="0">
                 <a:solidFill>
                   <a:schemeClr val="tx1"/>
                 </a:solidFill>
               </a:rPr>
-              <a:t>j</a:t>
+              <a:t>i</a:t>
             </a:r>
             <a:endParaRPr lang="en-US" sz="2800" dirty="0">
               <a:solidFill>

</xml_diff>